<commit_message>
corrected typo in PPTX diagram
</commit_message>
<xml_diff>
--- a/W2_intro_python.pptx
+++ b/W2_intro_python.pptx
@@ -3706,7 +3706,7 @@
           <a:effectLst/>
           <a:extLst>
             <a:ext uri="{91240B29-F687-4f45-9708-019B960494DF}">
-              <a14:hiddenLine xmlns="" xmlns:a14="http://schemas.microsoft.com/office/drawing/2010/main" w="9525">
+              <a14:hiddenLine xmlns:a14="http://schemas.microsoft.com/office/drawing/2010/main" xmlns="" w="9525">
                 <a:solidFill>
                   <a:srgbClr val="000000"/>
                 </a:solidFill>
@@ -3898,7 +3898,7 @@
           <a:p>
             <a:fld id="{2F3E8B1C-86EF-43CF-8304-249481088644}" type="datetimeFigureOut">
               <a:rPr lang="en-US" smtClean="0"/>
-              <a:t>4/7/21</a:t>
+              <a:t>4/8/21</a:t>
             </a:fld>
             <a:endParaRPr lang="en-US"/>
           </a:p>
@@ -4217,7 +4217,7 @@
             <a:fld id="{2F3E8B1C-86EF-43CF-8304-249481088644}" type="datetimeFigureOut">
               <a:rPr lang="en-US" smtClean="0"/>
               <a:pPr/>
-              <a:t>4/7/21</a:t>
+              <a:t>4/8/21</a:t>
             </a:fld>
             <a:endParaRPr lang="en-US" dirty="0"/>
           </a:p>
@@ -4707,7 +4707,7 @@
             <a:fld id="{2F3E8B1C-86EF-43CF-8304-249481088644}" type="datetimeFigureOut">
               <a:rPr lang="en-US" smtClean="0"/>
               <a:pPr/>
-              <a:t>4/7/21</a:t>
+              <a:t>4/8/21</a:t>
             </a:fld>
             <a:endParaRPr lang="en-US" dirty="0"/>
           </a:p>
@@ -5078,7 +5078,7 @@
             <a:fld id="{2F3E8B1C-86EF-43CF-8304-249481088644}" type="datetimeFigureOut">
               <a:rPr lang="en-US" smtClean="0"/>
               <a:pPr/>
-              <a:t>4/7/21</a:t>
+              <a:t>4/8/21</a:t>
             </a:fld>
             <a:endParaRPr lang="en-US" dirty="0"/>
           </a:p>
@@ -5234,7 +5234,7 @@
           <a:ln/>
           <a:extLst>
             <a:ext uri="{91240B29-F687-4f45-9708-019B960494DF}">
-              <a14:hiddenLine xmlns="" xmlns:a14="http://schemas.microsoft.com/office/drawing/2010/main" w="9525">
+              <a14:hiddenLine xmlns:a14="http://schemas.microsoft.com/office/drawing/2010/main" xmlns="" w="9525">
                 <a:solidFill>
                   <a:srgbClr val="000000"/>
                 </a:solidFill>
@@ -5352,7 +5352,7 @@
           <a:p>
             <a:fld id="{2F3E8B1C-86EF-43CF-8304-249481088644}" type="datetimeFigureOut">
               <a:rPr lang="en-US" smtClean="0"/>
-              <a:t>4/7/21</a:t>
+              <a:t>4/8/21</a:t>
             </a:fld>
             <a:endParaRPr lang="en-US"/>
           </a:p>
@@ -5509,7 +5509,7 @@
           <a:ln/>
           <a:extLst>
             <a:ext uri="{91240B29-F687-4f45-9708-019B960494DF}">
-              <a14:hiddenLine xmlns="" xmlns:a14="http://schemas.microsoft.com/office/drawing/2010/main" w="9525">
+              <a14:hiddenLine xmlns:a14="http://schemas.microsoft.com/office/drawing/2010/main" xmlns="" w="9525">
                 <a:solidFill>
                   <a:srgbClr val="000000"/>
                 </a:solidFill>
@@ -5637,7 +5637,7 @@
           <a:p>
             <a:fld id="{2F3E8B1C-86EF-43CF-8304-249481088644}" type="datetimeFigureOut">
               <a:rPr lang="en-US" smtClean="0"/>
-              <a:t>4/7/21</a:t>
+              <a:t>4/8/21</a:t>
             </a:fld>
             <a:endParaRPr lang="en-US"/>
           </a:p>
@@ -5792,7 +5792,7 @@
           <a:ln/>
           <a:extLst>
             <a:ext uri="{91240B29-F687-4f45-9708-019B960494DF}">
-              <a14:hiddenLine xmlns="" xmlns:a14="http://schemas.microsoft.com/office/drawing/2010/main" w="9525">
+              <a14:hiddenLine xmlns:a14="http://schemas.microsoft.com/office/drawing/2010/main" xmlns="" w="9525">
                 <a:solidFill>
                   <a:srgbClr val="000000"/>
                 </a:solidFill>
@@ -5920,7 +5920,7 @@
           <a:p>
             <a:fld id="{2F3E8B1C-86EF-43CF-8304-249481088644}" type="datetimeFigureOut">
               <a:rPr lang="en-US" smtClean="0"/>
-              <a:t>4/7/21</a:t>
+              <a:t>4/8/21</a:t>
             </a:fld>
             <a:endParaRPr lang="en-US"/>
           </a:p>
@@ -6263,7 +6263,7 @@
           <a:p>
             <a:fld id="{2F3E8B1C-86EF-43CF-8304-249481088644}" type="datetimeFigureOut">
               <a:rPr lang="en-US" smtClean="0"/>
-              <a:t>4/7/21</a:t>
+              <a:t>4/8/21</a:t>
             </a:fld>
             <a:endParaRPr lang="en-US"/>
           </a:p>
@@ -6418,7 +6418,7 @@
           <a:ln/>
           <a:extLst>
             <a:ext uri="{91240B29-F687-4f45-9708-019B960494DF}">
-              <a14:hiddenLine xmlns="" xmlns:a14="http://schemas.microsoft.com/office/drawing/2010/main" w="9525">
+              <a14:hiddenLine xmlns:a14="http://schemas.microsoft.com/office/drawing/2010/main" xmlns="" w="9525">
                 <a:solidFill>
                   <a:srgbClr val="000000"/>
                 </a:solidFill>
@@ -6602,7 +6602,7 @@
           <a:p>
             <a:fld id="{2F3E8B1C-86EF-43CF-8304-249481088644}" type="datetimeFigureOut">
               <a:rPr lang="en-US" smtClean="0"/>
-              <a:t>4/7/21</a:t>
+              <a:t>4/8/21</a:t>
             </a:fld>
             <a:endParaRPr lang="en-US"/>
           </a:p>
@@ -6757,7 +6757,7 @@
           <a:ln/>
           <a:extLst>
             <a:ext uri="{91240B29-F687-4f45-9708-019B960494DF}">
-              <a14:hiddenLine xmlns="" xmlns:a14="http://schemas.microsoft.com/office/drawing/2010/main" w="9525">
+              <a14:hiddenLine xmlns:a14="http://schemas.microsoft.com/office/drawing/2010/main" xmlns="" w="9525">
                 <a:solidFill>
                   <a:srgbClr val="000000"/>
                 </a:solidFill>
@@ -7079,7 +7079,7 @@
           <a:p>
             <a:fld id="{2F3E8B1C-86EF-43CF-8304-249481088644}" type="datetimeFigureOut">
               <a:rPr lang="en-US" smtClean="0"/>
-              <a:t>4/7/21</a:t>
+              <a:t>4/8/21</a:t>
             </a:fld>
             <a:endParaRPr lang="en-US"/>
           </a:p>
@@ -7234,7 +7234,7 @@
           <a:ln/>
           <a:extLst>
             <a:ext uri="{91240B29-F687-4f45-9708-019B960494DF}">
-              <a14:hiddenLine xmlns="" xmlns:a14="http://schemas.microsoft.com/office/drawing/2010/main" w="9525">
+              <a14:hiddenLine xmlns:a14="http://schemas.microsoft.com/office/drawing/2010/main" xmlns="" w="9525">
                 <a:solidFill>
                   <a:srgbClr val="000000"/>
                 </a:solidFill>
@@ -7300,7 +7300,7 @@
           <a:p>
             <a:fld id="{2F3E8B1C-86EF-43CF-8304-249481088644}" type="datetimeFigureOut">
               <a:rPr lang="en-US" smtClean="0"/>
-              <a:t>4/7/21</a:t>
+              <a:t>4/8/21</a:t>
             </a:fld>
             <a:endParaRPr lang="en-US"/>
           </a:p>
@@ -7395,7 +7395,7 @@
           <a:p>
             <a:fld id="{2F3E8B1C-86EF-43CF-8304-249481088644}" type="datetimeFigureOut">
               <a:rPr lang="en-US" smtClean="0"/>
-              <a:t>4/7/21</a:t>
+              <a:t>4/8/21</a:t>
             </a:fld>
             <a:endParaRPr lang="en-US"/>
           </a:p>
@@ -7663,7 +7663,7 @@
           <a:ln/>
           <a:extLst>
             <a:ext uri="{91240B29-F687-4f45-9708-019B960494DF}">
-              <a14:hiddenLine xmlns="" xmlns:a14="http://schemas.microsoft.com/office/drawing/2010/main" w="9525">
+              <a14:hiddenLine xmlns:a14="http://schemas.microsoft.com/office/drawing/2010/main" xmlns="" w="9525">
                 <a:solidFill>
                   <a:srgbClr val="000000"/>
                 </a:solidFill>
@@ -7862,7 +7862,7 @@
           <a:p>
             <a:fld id="{2F3E8B1C-86EF-43CF-8304-249481088644}" type="datetimeFigureOut">
               <a:rPr lang="en-US" smtClean="0"/>
-              <a:t>4/7/21</a:t>
+              <a:t>4/8/21</a:t>
             </a:fld>
             <a:endParaRPr lang="en-US"/>
           </a:p>
@@ -8176,7 +8176,7 @@
             <a:fld id="{2F3E8B1C-86EF-43CF-8304-249481088644}" type="datetimeFigureOut">
               <a:rPr lang="en-US" smtClean="0"/>
               <a:pPr/>
-              <a:t>4/7/21</a:t>
+              <a:t>4/8/21</a:t>
             </a:fld>
             <a:endParaRPr lang="en-US" dirty="0"/>
           </a:p>
@@ -8448,7 +8448,7 @@
             <a:fld id="{2F3E8B1C-86EF-43CF-8304-249481088644}" type="datetimeFigureOut">
               <a:rPr lang="en-US" smtClean="0"/>
               <a:pPr/>
-              <a:t>4/7/21</a:t>
+              <a:t>4/8/21</a:t>
             </a:fld>
             <a:endParaRPr lang="en-US" dirty="0"/>
           </a:p>
@@ -9506,10 +9506,10 @@
       </p:sp>
       <p:pic>
         <p:nvPicPr>
-          <p:cNvPr id="5" name="Content Placeholder 4" descr="Diagram&#10;&#10;Description automatically generated">
+          <p:cNvPr id="7" name="Content Placeholder 6" descr="Diagram&#10;&#10;Description automatically generated">
             <a:extLst>
               <a:ext uri="{FF2B5EF4-FFF2-40B4-BE49-F238E27FC236}">
-                <a16:creationId xmlns:a16="http://schemas.microsoft.com/office/drawing/2014/main" id="{25580D93-C94C-8F44-9415-E188D10E52BA}"/>
+                <a16:creationId xmlns:a16="http://schemas.microsoft.com/office/drawing/2014/main" id="{4C673150-F399-D849-8A1E-7DCF06543CDA}"/>
               </a:ext>
             </a:extLst>
           </p:cNvPr>
@@ -9528,8 +9528,8 @@
         </p:blipFill>
         <p:spPr>
           <a:xfrm>
-            <a:off x="2418754" y="2222500"/>
-            <a:ext cx="7354491" cy="3636963"/>
+            <a:off x="1894508" y="2222500"/>
+            <a:ext cx="8402983" cy="3636963"/>
           </a:xfrm>
         </p:spPr>
       </p:pic>
@@ -9896,10 +9896,10 @@
       </p:sp>
       <p:pic>
         <p:nvPicPr>
-          <p:cNvPr id="5" name="Content Placeholder 4" descr="Diagram&#10;&#10;Description automatically generated">
+          <p:cNvPr id="7" name="Content Placeholder 6" descr="Diagram&#10;&#10;Description automatically generated">
             <a:extLst>
               <a:ext uri="{FF2B5EF4-FFF2-40B4-BE49-F238E27FC236}">
-                <a16:creationId xmlns:a16="http://schemas.microsoft.com/office/drawing/2014/main" id="{5EF14457-949E-4941-A383-509B12A9FFD9}"/>
+                <a16:creationId xmlns:a16="http://schemas.microsoft.com/office/drawing/2014/main" id="{0AF4E198-E0EF-7247-A961-F2A5BE794AF6}"/>
               </a:ext>
             </a:extLst>
           </p:cNvPr>
@@ -9918,8 +9918,8 @@
         </p:blipFill>
         <p:spPr>
           <a:xfrm>
-            <a:off x="1552683" y="2222500"/>
-            <a:ext cx="9086634" cy="3636963"/>
+            <a:off x="1818497" y="2222500"/>
+            <a:ext cx="8555005" cy="3636963"/>
           </a:xfrm>
         </p:spPr>
       </p:pic>

</xml_diff>